<commit_message>
add opp and add sonias bio
</commit_message>
<xml_diff>
--- a/news.pptx
+++ b/news.pptx
@@ -118,7 +118,7 @@
 <file path=ppt/revisionInfo.xml><?xml version="1.0" encoding="utf-8"?>
 <p1510:revInfo xmlns:a="http://schemas.openxmlformats.org/drawingml/2006/main" xmlns:r="http://schemas.openxmlformats.org/officeDocument/2006/relationships" xmlns:p1510="http://schemas.microsoft.com/office/powerpoint/2015/10/main">
   <p1510:revLst>
-    <p1510:client id="{D453E9ED-2445-4863-8DAC-1F522F0E47F0}" v="16" dt="2021-10-26T10:27:44.800"/>
+    <p1510:client id="{D453E9ED-2445-4863-8DAC-1F522F0E47F0}" v="28" dt="2021-11-02T09:35:27.794"/>
   </p1510:revLst>
 </p1510:revInfo>
 </file>
@@ -127,8 +127,8 @@
 <pc:chgInfo xmlns:a="http://schemas.openxmlformats.org/drawingml/2006/main" xmlns:r="http://schemas.openxmlformats.org/officeDocument/2006/relationships" xmlns:ac="http://schemas.microsoft.com/office/drawing/2013/main/command" xmlns:pc="http://schemas.microsoft.com/office/powerpoint/2013/main/command">
   <pc:docChgLst>
     <pc:chgData name="Lenka Hasova" userId="ea5c8ace-893c-4ae9-95cf-0ff1299a7b7a" providerId="ADAL" clId="{D453E9ED-2445-4863-8DAC-1F522F0E47F0}"/>
-    <pc:docChg chg="custSel addSld modSld">
-      <pc:chgData name="Lenka Hasova" userId="ea5c8ace-893c-4ae9-95cf-0ff1299a7b7a" providerId="ADAL" clId="{D453E9ED-2445-4863-8DAC-1F522F0E47F0}" dt="2021-10-26T10:28:29.458" v="521" actId="1076"/>
+    <pc:docChg chg="undo custSel addSld modSld">
+      <pc:chgData name="Lenka Hasova" userId="ea5c8ace-893c-4ae9-95cf-0ff1299a7b7a" providerId="ADAL" clId="{D453E9ED-2445-4863-8DAC-1F522F0E47F0}" dt="2021-11-02T09:37:29.054" v="810" actId="1076"/>
       <pc:docMkLst>
         <pc:docMk/>
       </pc:docMkLst>
@@ -235,7 +235,7 @@
         </pc:picChg>
       </pc:sldChg>
       <pc:sldChg chg="addSp delSp modSp add mod">
-        <pc:chgData name="Lenka Hasova" userId="ea5c8ace-893c-4ae9-95cf-0ff1299a7b7a" providerId="ADAL" clId="{D453E9ED-2445-4863-8DAC-1F522F0E47F0}" dt="2021-10-26T10:28:29.458" v="521" actId="1076"/>
+        <pc:chgData name="Lenka Hasova" userId="ea5c8ace-893c-4ae9-95cf-0ff1299a7b7a" providerId="ADAL" clId="{D453E9ED-2445-4863-8DAC-1F522F0E47F0}" dt="2021-11-02T09:33:56.244" v="617" actId="21"/>
         <pc:sldMkLst>
           <pc:docMk/>
           <pc:sldMk cId="1491932171" sldId="258"/>
@@ -360,6 +360,30 @@
             <ac:spMk id="21" creationId="{F3399C2C-C336-4221-B875-C3FF9D8011C6}"/>
           </ac:spMkLst>
         </pc:spChg>
+        <pc:spChg chg="add mod">
+          <ac:chgData name="Lenka Hasova" userId="ea5c8ace-893c-4ae9-95cf-0ff1299a7b7a" providerId="ADAL" clId="{D453E9ED-2445-4863-8DAC-1F522F0E47F0}" dt="2021-11-02T09:23:30.074" v="524" actId="571"/>
+          <ac:spMkLst>
+            <pc:docMk/>
+            <pc:sldMk cId="1491932171" sldId="258"/>
+            <ac:spMk id="22" creationId="{EDAF9416-71F9-4453-9DE2-892918FA4333}"/>
+          </ac:spMkLst>
+        </pc:spChg>
+        <pc:spChg chg="add mod">
+          <ac:chgData name="Lenka Hasova" userId="ea5c8ace-893c-4ae9-95cf-0ff1299a7b7a" providerId="ADAL" clId="{D453E9ED-2445-4863-8DAC-1F522F0E47F0}" dt="2021-11-02T09:23:30.074" v="524" actId="571"/>
+          <ac:spMkLst>
+            <pc:docMk/>
+            <pc:sldMk cId="1491932171" sldId="258"/>
+            <ac:spMk id="23" creationId="{0CC412DF-C149-4519-AE7F-ACB4D641FB53}"/>
+          </ac:spMkLst>
+        </pc:spChg>
+        <pc:spChg chg="add del mod">
+          <ac:chgData name="Lenka Hasova" userId="ea5c8ace-893c-4ae9-95cf-0ff1299a7b7a" providerId="ADAL" clId="{D453E9ED-2445-4863-8DAC-1F522F0E47F0}" dt="2021-11-02T09:33:56.244" v="617" actId="21"/>
+          <ac:spMkLst>
+            <pc:docMk/>
+            <pc:sldMk cId="1491932171" sldId="258"/>
+            <ac:spMk id="24" creationId="{AC6A53B2-B191-41B4-B0CB-C5C98DBE8E9C}"/>
+          </ac:spMkLst>
+        </pc:spChg>
         <pc:picChg chg="add mod">
           <ac:chgData name="Lenka Hasova" userId="ea5c8ace-893c-4ae9-95cf-0ff1299a7b7a" providerId="ADAL" clId="{D453E9ED-2445-4863-8DAC-1F522F0E47F0}" dt="2021-10-26T10:21:13.750" v="215" actId="14100"/>
           <ac:picMkLst>
@@ -441,8 +465,8 @@
           </ac:picMkLst>
         </pc:picChg>
       </pc:sldChg>
-      <pc:sldChg chg="delSp new mod">
-        <pc:chgData name="Lenka Hasova" userId="ea5c8ace-893c-4ae9-95cf-0ff1299a7b7a" providerId="ADAL" clId="{D453E9ED-2445-4863-8DAC-1F522F0E47F0}" dt="2021-10-26T09:55:24.163" v="203" actId="478"/>
+      <pc:sldChg chg="addSp delSp modSp new mod">
+        <pc:chgData name="Lenka Hasova" userId="ea5c8ace-893c-4ae9-95cf-0ff1299a7b7a" providerId="ADAL" clId="{D453E9ED-2445-4863-8DAC-1F522F0E47F0}" dt="2021-11-02T09:37:29.054" v="810" actId="1076"/>
         <pc:sldMkLst>
           <pc:docMk/>
           <pc:sldMk cId="1798950392" sldId="259"/>
@@ -455,6 +479,14 @@
             <ac:spMk id="2" creationId="{270B5993-5B00-4BA6-B475-8449BFFA3E59}"/>
           </ac:spMkLst>
         </pc:spChg>
+        <pc:spChg chg="add mod">
+          <ac:chgData name="Lenka Hasova" userId="ea5c8ace-893c-4ae9-95cf-0ff1299a7b7a" providerId="ADAL" clId="{D453E9ED-2445-4863-8DAC-1F522F0E47F0}" dt="2021-11-02T09:23:21.772" v="522"/>
+          <ac:spMkLst>
+            <pc:docMk/>
+            <pc:sldMk cId="1798950392" sldId="259"/>
+            <ac:spMk id="2" creationId="{632C0D62-B4AD-478D-84C9-33179BDE50E0}"/>
+          </ac:spMkLst>
+        </pc:spChg>
         <pc:spChg chg="del">
           <ac:chgData name="Lenka Hasova" userId="ea5c8ace-893c-4ae9-95cf-0ff1299a7b7a" providerId="ADAL" clId="{D453E9ED-2445-4863-8DAC-1F522F0E47F0}" dt="2021-10-26T09:55:21.574" v="202" actId="478"/>
           <ac:spMkLst>
@@ -463,6 +495,126 @@
             <ac:spMk id="3" creationId="{D06AE8DE-D7FB-4CAA-99E0-703B7D77E797}"/>
           </ac:spMkLst>
         </pc:spChg>
+        <pc:spChg chg="add mod">
+          <ac:chgData name="Lenka Hasova" userId="ea5c8ace-893c-4ae9-95cf-0ff1299a7b7a" providerId="ADAL" clId="{D453E9ED-2445-4863-8DAC-1F522F0E47F0}" dt="2021-11-02T09:23:21.772" v="522"/>
+          <ac:spMkLst>
+            <pc:docMk/>
+            <pc:sldMk cId="1798950392" sldId="259"/>
+            <ac:spMk id="3" creationId="{EBF31359-98AD-4195-98E1-D422DB412006}"/>
+          </ac:spMkLst>
+        </pc:spChg>
+        <pc:spChg chg="add mod">
+          <ac:chgData name="Lenka Hasova" userId="ea5c8ace-893c-4ae9-95cf-0ff1299a7b7a" providerId="ADAL" clId="{D453E9ED-2445-4863-8DAC-1F522F0E47F0}" dt="2021-11-02T09:31:24.947" v="611" actId="14100"/>
+          <ac:spMkLst>
+            <pc:docMk/>
+            <pc:sldMk cId="1798950392" sldId="259"/>
+            <ac:spMk id="4" creationId="{C47CCC9E-770E-4406-A6E1-CF6DE9317D3D}"/>
+          </ac:spMkLst>
+        </pc:spChg>
+        <pc:spChg chg="add mod">
+          <ac:chgData name="Lenka Hasova" userId="ea5c8ace-893c-4ae9-95cf-0ff1299a7b7a" providerId="ADAL" clId="{D453E9ED-2445-4863-8DAC-1F522F0E47F0}" dt="2021-11-02T09:37:16.094" v="807" actId="1076"/>
+          <ac:spMkLst>
+            <pc:docMk/>
+            <pc:sldMk cId="1798950392" sldId="259"/>
+            <ac:spMk id="5" creationId="{B1223149-D466-401A-BC5C-DF1D37FFE6C2}"/>
+          </ac:spMkLst>
+        </pc:spChg>
+        <pc:spChg chg="add mod">
+          <ac:chgData name="Lenka Hasova" userId="ea5c8ace-893c-4ae9-95cf-0ff1299a7b7a" providerId="ADAL" clId="{D453E9ED-2445-4863-8DAC-1F522F0E47F0}" dt="2021-11-02T09:37:20.934" v="808" actId="1076"/>
+          <ac:spMkLst>
+            <pc:docMk/>
+            <pc:sldMk cId="1798950392" sldId="259"/>
+            <ac:spMk id="12" creationId="{FFB99DA8-16CE-4C40-8627-9C4A953D3E27}"/>
+          </ac:spMkLst>
+        </pc:spChg>
+        <pc:spChg chg="add mod">
+          <ac:chgData name="Lenka Hasova" userId="ea5c8ace-893c-4ae9-95cf-0ff1299a7b7a" providerId="ADAL" clId="{D453E9ED-2445-4863-8DAC-1F522F0E47F0}" dt="2021-11-02T09:30:42.821" v="598" actId="1076"/>
+          <ac:spMkLst>
+            <pc:docMk/>
+            <pc:sldMk cId="1798950392" sldId="259"/>
+            <ac:spMk id="13" creationId="{9C7A8F4E-6393-4000-9A87-B80D8E7ABBB8}"/>
+          </ac:spMkLst>
+        </pc:spChg>
+        <pc:spChg chg="add mod">
+          <ac:chgData name="Lenka Hasova" userId="ea5c8ace-893c-4ae9-95cf-0ff1299a7b7a" providerId="ADAL" clId="{D453E9ED-2445-4863-8DAC-1F522F0E47F0}" dt="2021-11-02T09:35:16.329" v="671" actId="1076"/>
+          <ac:spMkLst>
+            <pc:docMk/>
+            <pc:sldMk cId="1798950392" sldId="259"/>
+            <ac:spMk id="53" creationId="{952FC86B-1B62-42AD-8B5D-99B31900222C}"/>
+          </ac:spMkLst>
+        </pc:spChg>
+        <pc:spChg chg="add mod">
+          <ac:chgData name="Lenka Hasova" userId="ea5c8ace-893c-4ae9-95cf-0ff1299a7b7a" providerId="ADAL" clId="{D453E9ED-2445-4863-8DAC-1F522F0E47F0}" dt="2021-11-02T09:37:29.054" v="810" actId="1076"/>
+          <ac:spMkLst>
+            <pc:docMk/>
+            <pc:sldMk cId="1798950392" sldId="259"/>
+            <ac:spMk id="54" creationId="{C7C354F4-3F78-4684-9F0F-FDCA3AA5E8AE}"/>
+          </ac:spMkLst>
+        </pc:spChg>
+        <pc:picChg chg="add mod modCrop">
+          <ac:chgData name="Lenka Hasova" userId="ea5c8ace-893c-4ae9-95cf-0ff1299a7b7a" providerId="ADAL" clId="{D453E9ED-2445-4863-8DAC-1F522F0E47F0}" dt="2021-11-02T09:30:53.733" v="603" actId="1076"/>
+          <ac:picMkLst>
+            <pc:docMk/>
+            <pc:sldMk cId="1798950392" sldId="259"/>
+            <ac:picMk id="7" creationId="{17222C93-43B3-4830-BB9B-52F171EACD91}"/>
+          </ac:picMkLst>
+        </pc:picChg>
+        <pc:picChg chg="add mod">
+          <ac:chgData name="Lenka Hasova" userId="ea5c8ace-893c-4ae9-95cf-0ff1299a7b7a" providerId="ADAL" clId="{D453E9ED-2445-4863-8DAC-1F522F0E47F0}" dt="2021-11-02T09:30:07.836" v="591" actId="14100"/>
+          <ac:picMkLst>
+            <pc:docMk/>
+            <pc:sldMk cId="1798950392" sldId="259"/>
+            <ac:picMk id="9" creationId="{4CF4AA19-3E60-4BAB-AC9B-FAAAD16D2DEB}"/>
+          </ac:picMkLst>
+        </pc:picChg>
+        <pc:picChg chg="add mod modCrop">
+          <ac:chgData name="Lenka Hasova" userId="ea5c8ace-893c-4ae9-95cf-0ff1299a7b7a" providerId="ADAL" clId="{D453E9ED-2445-4863-8DAC-1F522F0E47F0}" dt="2021-11-02T09:30:52.006" v="602" actId="1076"/>
+          <ac:picMkLst>
+            <pc:docMk/>
+            <pc:sldMk cId="1798950392" sldId="259"/>
+            <ac:picMk id="11" creationId="{2B9D9AEB-80AA-46D5-9AF4-1218B9402F0A}"/>
+          </ac:picMkLst>
+        </pc:picChg>
+        <pc:picChg chg="add mod">
+          <ac:chgData name="Lenka Hasova" userId="ea5c8ace-893c-4ae9-95cf-0ff1299a7b7a" providerId="ADAL" clId="{D453E9ED-2445-4863-8DAC-1F522F0E47F0}" dt="2021-11-02T09:33:47.168" v="615" actId="1076"/>
+          <ac:picMkLst>
+            <pc:docMk/>
+            <pc:sldMk cId="1798950392" sldId="259"/>
+            <ac:picMk id="52" creationId="{B4908FE8-CD3B-4352-807D-ADC32B680CFB}"/>
+          </ac:picMkLst>
+        </pc:picChg>
+        <pc:cxnChg chg="add mod">
+          <ac:chgData name="Lenka Hasova" userId="ea5c8ace-893c-4ae9-95cf-0ff1299a7b7a" providerId="ADAL" clId="{D453E9ED-2445-4863-8DAC-1F522F0E47F0}" dt="2021-11-02T09:30:42.821" v="598" actId="1076"/>
+          <ac:cxnSpMkLst>
+            <pc:docMk/>
+            <pc:sldMk cId="1798950392" sldId="259"/>
+            <ac:cxnSpMk id="15" creationId="{5F013155-8FEF-49FE-A455-825A8D7DE4C6}"/>
+          </ac:cxnSpMkLst>
+        </pc:cxnChg>
+        <pc:cxnChg chg="add mod">
+          <ac:chgData name="Lenka Hasova" userId="ea5c8ace-893c-4ae9-95cf-0ff1299a7b7a" providerId="ADAL" clId="{D453E9ED-2445-4863-8DAC-1F522F0E47F0}" dt="2021-11-02T09:37:20.934" v="808" actId="1076"/>
+          <ac:cxnSpMkLst>
+            <pc:docMk/>
+            <pc:sldMk cId="1798950392" sldId="259"/>
+            <ac:cxnSpMk id="17" creationId="{91889BBC-1A7E-4397-BCFA-2B573B3B435E}"/>
+          </ac:cxnSpMkLst>
+        </pc:cxnChg>
+        <pc:cxnChg chg="add mod">
+          <ac:chgData name="Lenka Hasova" userId="ea5c8ace-893c-4ae9-95cf-0ff1299a7b7a" providerId="ADAL" clId="{D453E9ED-2445-4863-8DAC-1F522F0E47F0}" dt="2021-11-02T09:30:52.006" v="602" actId="1076"/>
+          <ac:cxnSpMkLst>
+            <pc:docMk/>
+            <pc:sldMk cId="1798950392" sldId="259"/>
+            <ac:cxnSpMk id="21" creationId="{F0B24F8E-0D30-43E5-8CD7-46F1E57B30B7}"/>
+          </ac:cxnSpMkLst>
+        </pc:cxnChg>
+        <pc:cxnChg chg="add mod">
+          <ac:chgData name="Lenka Hasova" userId="ea5c8ace-893c-4ae9-95cf-0ff1299a7b7a" providerId="ADAL" clId="{D453E9ED-2445-4863-8DAC-1F522F0E47F0}" dt="2021-11-02T09:37:20.934" v="808" actId="1076"/>
+          <ac:cxnSpMkLst>
+            <pc:docMk/>
+            <pc:sldMk cId="1798950392" sldId="259"/>
+            <ac:cxnSpMk id="25" creationId="{A27B20E4-90A0-4AD0-A910-1979D13FBEF9}"/>
+          </ac:cxnSpMkLst>
+        </pc:cxnChg>
       </pc:sldChg>
     </pc:docChg>
   </pc:docChgLst>
@@ -618,7 +770,7 @@
           <a:p>
             <a:fld id="{7A5AD6B1-77C4-4C61-A1B3-827CDB98672B}" type="datetimeFigureOut">
               <a:rPr lang="en-GB" smtClean="0"/>
-              <a:t>26/10/2021</a:t>
+              <a:t>02/11/2021</a:t>
             </a:fld>
             <a:endParaRPr lang="en-GB"/>
           </a:p>
@@ -818,7 +970,7 @@
           <a:p>
             <a:fld id="{7A5AD6B1-77C4-4C61-A1B3-827CDB98672B}" type="datetimeFigureOut">
               <a:rPr lang="en-GB" smtClean="0"/>
-              <a:t>26/10/2021</a:t>
+              <a:t>02/11/2021</a:t>
             </a:fld>
             <a:endParaRPr lang="en-GB"/>
           </a:p>
@@ -1028,7 +1180,7 @@
           <a:p>
             <a:fld id="{7A5AD6B1-77C4-4C61-A1B3-827CDB98672B}" type="datetimeFigureOut">
               <a:rPr lang="en-GB" smtClean="0"/>
-              <a:t>26/10/2021</a:t>
+              <a:t>02/11/2021</a:t>
             </a:fld>
             <a:endParaRPr lang="en-GB"/>
           </a:p>
@@ -1228,7 +1380,7 @@
           <a:p>
             <a:fld id="{7A5AD6B1-77C4-4C61-A1B3-827CDB98672B}" type="datetimeFigureOut">
               <a:rPr lang="en-GB" smtClean="0"/>
-              <a:t>26/10/2021</a:t>
+              <a:t>02/11/2021</a:t>
             </a:fld>
             <a:endParaRPr lang="en-GB"/>
           </a:p>
@@ -1504,7 +1656,7 @@
           <a:p>
             <a:fld id="{7A5AD6B1-77C4-4C61-A1B3-827CDB98672B}" type="datetimeFigureOut">
               <a:rPr lang="en-GB" smtClean="0"/>
-              <a:t>26/10/2021</a:t>
+              <a:t>02/11/2021</a:t>
             </a:fld>
             <a:endParaRPr lang="en-GB"/>
           </a:p>
@@ -1772,7 +1924,7 @@
           <a:p>
             <a:fld id="{7A5AD6B1-77C4-4C61-A1B3-827CDB98672B}" type="datetimeFigureOut">
               <a:rPr lang="en-GB" smtClean="0"/>
-              <a:t>26/10/2021</a:t>
+              <a:t>02/11/2021</a:t>
             </a:fld>
             <a:endParaRPr lang="en-GB"/>
           </a:p>
@@ -2187,7 +2339,7 @@
           <a:p>
             <a:fld id="{7A5AD6B1-77C4-4C61-A1B3-827CDB98672B}" type="datetimeFigureOut">
               <a:rPr lang="en-GB" smtClean="0"/>
-              <a:t>26/10/2021</a:t>
+              <a:t>02/11/2021</a:t>
             </a:fld>
             <a:endParaRPr lang="en-GB"/>
           </a:p>
@@ -2329,7 +2481,7 @@
           <a:p>
             <a:fld id="{7A5AD6B1-77C4-4C61-A1B3-827CDB98672B}" type="datetimeFigureOut">
               <a:rPr lang="en-GB" smtClean="0"/>
-              <a:t>26/10/2021</a:t>
+              <a:t>02/11/2021</a:t>
             </a:fld>
             <a:endParaRPr lang="en-GB"/>
           </a:p>
@@ -2442,7 +2594,7 @@
           <a:p>
             <a:fld id="{7A5AD6B1-77C4-4C61-A1B3-827CDB98672B}" type="datetimeFigureOut">
               <a:rPr lang="en-GB" smtClean="0"/>
-              <a:t>26/10/2021</a:t>
+              <a:t>02/11/2021</a:t>
             </a:fld>
             <a:endParaRPr lang="en-GB"/>
           </a:p>
@@ -2755,7 +2907,7 @@
           <a:p>
             <a:fld id="{7A5AD6B1-77C4-4C61-A1B3-827CDB98672B}" type="datetimeFigureOut">
               <a:rPr lang="en-GB" smtClean="0"/>
-              <a:t>26/10/2021</a:t>
+              <a:t>02/11/2021</a:t>
             </a:fld>
             <a:endParaRPr lang="en-GB"/>
           </a:p>
@@ -3044,7 +3196,7 @@
           <a:p>
             <a:fld id="{7A5AD6B1-77C4-4C61-A1B3-827CDB98672B}" type="datetimeFigureOut">
               <a:rPr lang="en-GB" smtClean="0"/>
-              <a:t>26/10/2021</a:t>
+              <a:t>02/11/2021</a:t>
             </a:fld>
             <a:endParaRPr lang="en-GB"/>
           </a:p>
@@ -3287,7 +3439,7 @@
           <a:p>
             <a:fld id="{7A5AD6B1-77C4-4C61-A1B3-827CDB98672B}" type="datetimeFigureOut">
               <a:rPr lang="en-GB" smtClean="0"/>
-              <a:t>26/10/2021</a:t>
+              <a:t>02/11/2021</a:t>
             </a:fld>
             <a:endParaRPr lang="en-GB"/>
           </a:p>
@@ -5340,6 +5492,648 @@
           <a:chExt cx="0" cy="0"/>
         </a:xfrm>
       </p:grpSpPr>
+      <p:sp>
+        <p:nvSpPr>
+          <p:cNvPr id="2" name="TextBox 1">
+            <a:extLst>
+              <a:ext uri="{FF2B5EF4-FFF2-40B4-BE49-F238E27FC236}">
+                <a16:creationId xmlns:a16="http://schemas.microsoft.com/office/drawing/2014/main" id="{632C0D62-B4AD-478D-84C9-33179BDE50E0}"/>
+              </a:ext>
+            </a:extLst>
+          </p:cNvPr>
+          <p:cNvSpPr txBox="1"/>
+          <p:nvPr/>
+        </p:nvSpPr>
+        <p:spPr>
+          <a:xfrm>
+            <a:off x="327803" y="109670"/>
+            <a:ext cx="2115131" cy="523220"/>
+          </a:xfrm>
+          <a:prstGeom prst="rect">
+            <a:avLst/>
+          </a:prstGeom>
+          <a:noFill/>
+        </p:spPr>
+        <p:txBody>
+          <a:bodyPr wrap="none" rtlCol="0">
+            <a:spAutoFit/>
+          </a:bodyPr>
+          <a:lstStyle/>
+          <a:p>
+            <a:r>
+              <a:rPr lang="en-GB" sz="2800" b="1" dirty="0">
+                <a:solidFill>
+                  <a:srgbClr val="FF0000"/>
+                </a:solidFill>
+              </a:rPr>
+              <a:t>What’s new?</a:t>
+            </a:r>
+          </a:p>
+        </p:txBody>
+      </p:sp>
+      <p:sp>
+        <p:nvSpPr>
+          <p:cNvPr id="3" name="TextBox 2">
+            <a:extLst>
+              <a:ext uri="{FF2B5EF4-FFF2-40B4-BE49-F238E27FC236}">
+                <a16:creationId xmlns:a16="http://schemas.microsoft.com/office/drawing/2014/main" id="{EBF31359-98AD-4195-98E1-D422DB412006}"/>
+              </a:ext>
+            </a:extLst>
+          </p:cNvPr>
+          <p:cNvSpPr txBox="1"/>
+          <p:nvPr/>
+        </p:nvSpPr>
+        <p:spPr>
+          <a:xfrm>
+            <a:off x="9183911" y="203074"/>
+            <a:ext cx="2680286" cy="523220"/>
+          </a:xfrm>
+          <a:prstGeom prst="rect">
+            <a:avLst/>
+          </a:prstGeom>
+          <a:noFill/>
+        </p:spPr>
+        <p:txBody>
+          <a:bodyPr wrap="none" rtlCol="0">
+            <a:spAutoFit/>
+          </a:bodyPr>
+          <a:lstStyle/>
+          <a:p>
+            <a:r>
+              <a:rPr lang="en-GB" sz="2800" b="1" dirty="0">
+                <a:solidFill>
+                  <a:srgbClr val="FF0000"/>
+                </a:solidFill>
+              </a:rPr>
+              <a:t>geogbrowns.info</a:t>
+            </a:r>
+          </a:p>
+        </p:txBody>
+      </p:sp>
+      <p:sp>
+        <p:nvSpPr>
+          <p:cNvPr id="4" name="Rectangle 3">
+            <a:extLst>
+              <a:ext uri="{FF2B5EF4-FFF2-40B4-BE49-F238E27FC236}">
+                <a16:creationId xmlns:a16="http://schemas.microsoft.com/office/drawing/2014/main" id="{C47CCC9E-770E-4406-A6E1-CF6DE9317D3D}"/>
+              </a:ext>
+            </a:extLst>
+          </p:cNvPr>
+          <p:cNvSpPr/>
+          <p:nvPr/>
+        </p:nvSpPr>
+        <p:spPr>
+          <a:xfrm>
+            <a:off x="-207033" y="4630534"/>
+            <a:ext cx="12603848" cy="2509100"/>
+          </a:xfrm>
+          <a:prstGeom prst="rect">
+            <a:avLst/>
+          </a:prstGeom>
+          <a:solidFill>
+            <a:schemeClr val="accent1">
+              <a:lumMod val="20000"/>
+              <a:lumOff val="80000"/>
+            </a:schemeClr>
+          </a:solidFill>
+          <a:ln>
+            <a:noFill/>
+          </a:ln>
+        </p:spPr>
+        <p:style>
+          <a:lnRef idx="2">
+            <a:schemeClr val="accent1">
+              <a:shade val="50000"/>
+            </a:schemeClr>
+          </a:lnRef>
+          <a:fillRef idx="1">
+            <a:schemeClr val="accent1"/>
+          </a:fillRef>
+          <a:effectRef idx="0">
+            <a:schemeClr val="accent1"/>
+          </a:effectRef>
+          <a:fontRef idx="minor">
+            <a:schemeClr val="lt1"/>
+          </a:fontRef>
+        </p:style>
+        <p:txBody>
+          <a:bodyPr rtlCol="0" anchor="ctr"/>
+          <a:lstStyle/>
+          <a:p>
+            <a:pPr algn="ctr"/>
+            <a:endParaRPr lang="en-GB"/>
+          </a:p>
+        </p:txBody>
+      </p:sp>
+      <p:sp>
+        <p:nvSpPr>
+          <p:cNvPr id="5" name="Rectangle 4">
+            <a:extLst>
+              <a:ext uri="{FF2B5EF4-FFF2-40B4-BE49-F238E27FC236}">
+                <a16:creationId xmlns:a16="http://schemas.microsoft.com/office/drawing/2014/main" id="{B1223149-D466-401A-BC5C-DF1D37FFE6C2}"/>
+              </a:ext>
+            </a:extLst>
+          </p:cNvPr>
+          <p:cNvSpPr/>
+          <p:nvPr/>
+        </p:nvSpPr>
+        <p:spPr>
+          <a:xfrm>
+            <a:off x="0" y="632890"/>
+            <a:ext cx="12396815" cy="4179588"/>
+          </a:xfrm>
+          <a:prstGeom prst="rect">
+            <a:avLst/>
+          </a:prstGeom>
+          <a:solidFill>
+            <a:schemeClr val="accent4">
+              <a:lumMod val="20000"/>
+              <a:lumOff val="80000"/>
+            </a:schemeClr>
+          </a:solidFill>
+          <a:ln>
+            <a:noFill/>
+          </a:ln>
+        </p:spPr>
+        <p:style>
+          <a:lnRef idx="2">
+            <a:schemeClr val="accent1">
+              <a:shade val="50000"/>
+            </a:schemeClr>
+          </a:lnRef>
+          <a:fillRef idx="1">
+            <a:schemeClr val="accent1"/>
+          </a:fillRef>
+          <a:effectRef idx="0">
+            <a:schemeClr val="accent1"/>
+          </a:effectRef>
+          <a:fontRef idx="minor">
+            <a:schemeClr val="lt1"/>
+          </a:fontRef>
+        </p:style>
+        <p:txBody>
+          <a:bodyPr rtlCol="0" anchor="ctr"/>
+          <a:lstStyle/>
+          <a:p>
+            <a:pPr algn="ctr"/>
+            <a:endParaRPr lang="en-GB"/>
+          </a:p>
+        </p:txBody>
+      </p:sp>
+      <p:pic>
+        <p:nvPicPr>
+          <p:cNvPr id="7" name="Picture 6">
+            <a:extLst>
+              <a:ext uri="{FF2B5EF4-FFF2-40B4-BE49-F238E27FC236}">
+                <a16:creationId xmlns:a16="http://schemas.microsoft.com/office/drawing/2014/main" id="{17222C93-43B3-4830-BB9B-52F171EACD91}"/>
+              </a:ext>
+            </a:extLst>
+          </p:cNvPr>
+          <p:cNvPicPr>
+            <a:picLocks noChangeAspect="1"/>
+          </p:cNvPicPr>
+          <p:nvPr/>
+        </p:nvPicPr>
+        <p:blipFill rotWithShape="1">
+          <a:blip r:embed="rId2"/>
+          <a:srcRect t="3357"/>
+          <a:stretch/>
+        </p:blipFill>
+        <p:spPr>
+          <a:xfrm>
+            <a:off x="6277817" y="2582072"/>
+            <a:ext cx="2661345" cy="2230406"/>
+          </a:xfrm>
+          <a:prstGeom prst="rect">
+            <a:avLst/>
+          </a:prstGeom>
+        </p:spPr>
+      </p:pic>
+      <p:pic>
+        <p:nvPicPr>
+          <p:cNvPr id="9" name="Picture 8">
+            <a:extLst>
+              <a:ext uri="{FF2B5EF4-FFF2-40B4-BE49-F238E27FC236}">
+                <a16:creationId xmlns:a16="http://schemas.microsoft.com/office/drawing/2014/main" id="{4CF4AA19-3E60-4BAB-AC9B-FAAAD16D2DEB}"/>
+              </a:ext>
+            </a:extLst>
+          </p:cNvPr>
+          <p:cNvPicPr>
+            <a:picLocks noChangeAspect="1"/>
+          </p:cNvPicPr>
+          <p:nvPr/>
+        </p:nvPicPr>
+        <p:blipFill>
+          <a:blip r:embed="rId3"/>
+          <a:stretch>
+            <a:fillRect/>
+          </a:stretch>
+        </p:blipFill>
+        <p:spPr>
+          <a:xfrm>
+            <a:off x="206031" y="1198594"/>
+            <a:ext cx="2533643" cy="3304395"/>
+          </a:xfrm>
+          <a:prstGeom prst="rect">
+            <a:avLst/>
+          </a:prstGeom>
+        </p:spPr>
+      </p:pic>
+      <p:pic>
+        <p:nvPicPr>
+          <p:cNvPr id="11" name="Picture 10">
+            <a:extLst>
+              <a:ext uri="{FF2B5EF4-FFF2-40B4-BE49-F238E27FC236}">
+                <a16:creationId xmlns:a16="http://schemas.microsoft.com/office/drawing/2014/main" id="{2B9D9AEB-80AA-46D5-9AF4-1218B9402F0A}"/>
+              </a:ext>
+            </a:extLst>
+          </p:cNvPr>
+          <p:cNvPicPr>
+            <a:picLocks noChangeAspect="1"/>
+          </p:cNvPicPr>
+          <p:nvPr/>
+        </p:nvPicPr>
+        <p:blipFill rotWithShape="1">
+          <a:blip r:embed="rId4"/>
+          <a:srcRect l="10574" t="10676" r="6153"/>
+          <a:stretch/>
+        </p:blipFill>
+        <p:spPr>
+          <a:xfrm>
+            <a:off x="6104920" y="726294"/>
+            <a:ext cx="3566661" cy="1501173"/>
+          </a:xfrm>
+          <a:prstGeom prst="rect">
+            <a:avLst/>
+          </a:prstGeom>
+        </p:spPr>
+      </p:pic>
+      <p:sp>
+        <p:nvSpPr>
+          <p:cNvPr id="12" name="TextBox 11">
+            <a:extLst>
+              <a:ext uri="{FF2B5EF4-FFF2-40B4-BE49-F238E27FC236}">
+                <a16:creationId xmlns:a16="http://schemas.microsoft.com/office/drawing/2014/main" id="{FFB99DA8-16CE-4C40-8627-9C4A953D3E27}"/>
+              </a:ext>
+            </a:extLst>
+          </p:cNvPr>
+          <p:cNvSpPr txBox="1"/>
+          <p:nvPr/>
+        </p:nvSpPr>
+        <p:spPr>
+          <a:xfrm>
+            <a:off x="3404534" y="3145504"/>
+            <a:ext cx="2208421" cy="707886"/>
+          </a:xfrm>
+          <a:prstGeom prst="rect">
+            <a:avLst/>
+          </a:prstGeom>
+          <a:solidFill>
+            <a:schemeClr val="bg1"/>
+          </a:solidFill>
+        </p:spPr>
+        <p:txBody>
+          <a:bodyPr wrap="square" rtlCol="0">
+            <a:spAutoFit/>
+          </a:bodyPr>
+          <a:lstStyle/>
+          <a:p>
+            <a:pPr algn="ctr"/>
+            <a:r>
+              <a:rPr lang="en-GB" sz="2000" dirty="0">
+                <a:latin typeface="Arial" panose="020B0604020202020204" pitchFamily="34" charset="0"/>
+                <a:cs typeface="Arial" panose="020B0604020202020204" pitchFamily="34" charset="0"/>
+              </a:rPr>
+              <a:t>Tools &amp; Links – research groups</a:t>
+            </a:r>
+          </a:p>
+        </p:txBody>
+      </p:sp>
+      <p:sp>
+        <p:nvSpPr>
+          <p:cNvPr id="13" name="TextBox 12">
+            <a:extLst>
+              <a:ext uri="{FF2B5EF4-FFF2-40B4-BE49-F238E27FC236}">
+                <a16:creationId xmlns:a16="http://schemas.microsoft.com/office/drawing/2014/main" id="{9C7A8F4E-6393-4000-9A87-B80D8E7ABBB8}"/>
+              </a:ext>
+            </a:extLst>
+          </p:cNvPr>
+          <p:cNvSpPr txBox="1"/>
+          <p:nvPr/>
+        </p:nvSpPr>
+        <p:spPr>
+          <a:xfrm>
+            <a:off x="3571277" y="1050875"/>
+            <a:ext cx="1874937" cy="400110"/>
+          </a:xfrm>
+          <a:prstGeom prst="rect">
+            <a:avLst/>
+          </a:prstGeom>
+          <a:solidFill>
+            <a:schemeClr val="bg1"/>
+          </a:solidFill>
+        </p:spPr>
+        <p:txBody>
+          <a:bodyPr wrap="square" rtlCol="0">
+            <a:spAutoFit/>
+          </a:bodyPr>
+          <a:lstStyle/>
+          <a:p>
+            <a:pPr algn="ctr"/>
+            <a:r>
+              <a:rPr lang="en-GB" sz="2000" dirty="0">
+                <a:latin typeface="Arial" panose="020B0604020202020204" pitchFamily="34" charset="0"/>
+                <a:cs typeface="Arial" panose="020B0604020202020204" pitchFamily="34" charset="0"/>
+              </a:rPr>
+              <a:t>Main page</a:t>
+            </a:r>
+          </a:p>
+        </p:txBody>
+      </p:sp>
+      <p:cxnSp>
+        <p:nvCxnSpPr>
+          <p:cNvPr id="15" name="Straight Arrow Connector 14">
+            <a:extLst>
+              <a:ext uri="{FF2B5EF4-FFF2-40B4-BE49-F238E27FC236}">
+                <a16:creationId xmlns:a16="http://schemas.microsoft.com/office/drawing/2014/main" id="{5F013155-8FEF-49FE-A455-825A8D7DE4C6}"/>
+              </a:ext>
+            </a:extLst>
+          </p:cNvPr>
+          <p:cNvCxnSpPr>
+            <a:cxnSpLocks/>
+            <a:stCxn id="9" idx="3"/>
+            <a:endCxn id="13" idx="1"/>
+          </p:cNvCxnSpPr>
+          <p:nvPr/>
+        </p:nvCxnSpPr>
+        <p:spPr>
+          <a:xfrm flipV="1">
+            <a:off x="2739674" y="1250930"/>
+            <a:ext cx="831603" cy="1599862"/>
+          </a:xfrm>
+          <a:prstGeom prst="straightConnector1">
+            <a:avLst/>
+          </a:prstGeom>
+          <a:ln w="28575">
+            <a:solidFill>
+              <a:schemeClr val="tx1"/>
+            </a:solidFill>
+            <a:tailEnd type="triangle"/>
+          </a:ln>
+        </p:spPr>
+        <p:style>
+          <a:lnRef idx="1">
+            <a:schemeClr val="accent1"/>
+          </a:lnRef>
+          <a:fillRef idx="0">
+            <a:schemeClr val="accent1"/>
+          </a:fillRef>
+          <a:effectRef idx="0">
+            <a:schemeClr val="accent1"/>
+          </a:effectRef>
+          <a:fontRef idx="minor">
+            <a:schemeClr val="tx1"/>
+          </a:fontRef>
+        </p:style>
+      </p:cxnSp>
+      <p:cxnSp>
+        <p:nvCxnSpPr>
+          <p:cNvPr id="17" name="Straight Arrow Connector 16">
+            <a:extLst>
+              <a:ext uri="{FF2B5EF4-FFF2-40B4-BE49-F238E27FC236}">
+                <a16:creationId xmlns:a16="http://schemas.microsoft.com/office/drawing/2014/main" id="{91889BBC-1A7E-4397-BCFA-2B573B3B435E}"/>
+              </a:ext>
+            </a:extLst>
+          </p:cNvPr>
+          <p:cNvCxnSpPr>
+            <a:cxnSpLocks/>
+            <a:stCxn id="9" idx="3"/>
+            <a:endCxn id="12" idx="1"/>
+          </p:cNvCxnSpPr>
+          <p:nvPr/>
+        </p:nvCxnSpPr>
+        <p:spPr>
+          <a:xfrm>
+            <a:off x="2739674" y="2850792"/>
+            <a:ext cx="664860" cy="648655"/>
+          </a:xfrm>
+          <a:prstGeom prst="straightConnector1">
+            <a:avLst/>
+          </a:prstGeom>
+          <a:ln w="28575">
+            <a:solidFill>
+              <a:schemeClr val="tx1"/>
+            </a:solidFill>
+            <a:tailEnd type="triangle"/>
+          </a:ln>
+        </p:spPr>
+        <p:style>
+          <a:lnRef idx="1">
+            <a:schemeClr val="accent1"/>
+          </a:lnRef>
+          <a:fillRef idx="0">
+            <a:schemeClr val="accent1"/>
+          </a:fillRef>
+          <a:effectRef idx="0">
+            <a:schemeClr val="accent1"/>
+          </a:effectRef>
+          <a:fontRef idx="minor">
+            <a:schemeClr val="tx1"/>
+          </a:fontRef>
+        </p:style>
+      </p:cxnSp>
+      <p:cxnSp>
+        <p:nvCxnSpPr>
+          <p:cNvPr id="21" name="Straight Arrow Connector 20">
+            <a:extLst>
+              <a:ext uri="{FF2B5EF4-FFF2-40B4-BE49-F238E27FC236}">
+                <a16:creationId xmlns:a16="http://schemas.microsoft.com/office/drawing/2014/main" id="{F0B24F8E-0D30-43E5-8CD7-46F1E57B30B7}"/>
+              </a:ext>
+            </a:extLst>
+          </p:cNvPr>
+          <p:cNvCxnSpPr>
+            <a:cxnSpLocks/>
+            <a:stCxn id="13" idx="3"/>
+            <a:endCxn id="11" idx="1"/>
+          </p:cNvCxnSpPr>
+          <p:nvPr/>
+        </p:nvCxnSpPr>
+        <p:spPr>
+          <a:xfrm>
+            <a:off x="5446214" y="1250930"/>
+            <a:ext cx="658706" cy="225951"/>
+          </a:xfrm>
+          <a:prstGeom prst="straightConnector1">
+            <a:avLst/>
+          </a:prstGeom>
+          <a:ln w="28575">
+            <a:solidFill>
+              <a:schemeClr val="tx1"/>
+            </a:solidFill>
+            <a:tailEnd type="triangle"/>
+          </a:ln>
+        </p:spPr>
+        <p:style>
+          <a:lnRef idx="1">
+            <a:schemeClr val="accent1"/>
+          </a:lnRef>
+          <a:fillRef idx="0">
+            <a:schemeClr val="accent1"/>
+          </a:fillRef>
+          <a:effectRef idx="0">
+            <a:schemeClr val="accent1"/>
+          </a:effectRef>
+          <a:fontRef idx="minor">
+            <a:schemeClr val="tx1"/>
+          </a:fontRef>
+        </p:style>
+      </p:cxnSp>
+      <p:cxnSp>
+        <p:nvCxnSpPr>
+          <p:cNvPr id="25" name="Straight Arrow Connector 24">
+            <a:extLst>
+              <a:ext uri="{FF2B5EF4-FFF2-40B4-BE49-F238E27FC236}">
+                <a16:creationId xmlns:a16="http://schemas.microsoft.com/office/drawing/2014/main" id="{A27B20E4-90A0-4AD0-A910-1979D13FBEF9}"/>
+              </a:ext>
+            </a:extLst>
+          </p:cNvPr>
+          <p:cNvCxnSpPr>
+            <a:cxnSpLocks/>
+            <a:stCxn id="12" idx="3"/>
+            <a:endCxn id="7" idx="1"/>
+          </p:cNvCxnSpPr>
+          <p:nvPr/>
+        </p:nvCxnSpPr>
+        <p:spPr>
+          <a:xfrm>
+            <a:off x="5612955" y="3499447"/>
+            <a:ext cx="664862" cy="197828"/>
+          </a:xfrm>
+          <a:prstGeom prst="straightConnector1">
+            <a:avLst/>
+          </a:prstGeom>
+          <a:ln w="28575">
+            <a:solidFill>
+              <a:schemeClr val="tx1"/>
+            </a:solidFill>
+            <a:tailEnd type="triangle"/>
+          </a:ln>
+        </p:spPr>
+        <p:style>
+          <a:lnRef idx="1">
+            <a:schemeClr val="accent1"/>
+          </a:lnRef>
+          <a:fillRef idx="0">
+            <a:schemeClr val="accent1"/>
+          </a:fillRef>
+          <a:effectRef idx="0">
+            <a:schemeClr val="accent1"/>
+          </a:effectRef>
+          <a:fontRef idx="minor">
+            <a:schemeClr val="tx1"/>
+          </a:fontRef>
+        </p:style>
+      </p:cxnSp>
+      <p:pic>
+        <p:nvPicPr>
+          <p:cNvPr id="52" name="Picture 51">
+            <a:extLst>
+              <a:ext uri="{FF2B5EF4-FFF2-40B4-BE49-F238E27FC236}">
+                <a16:creationId xmlns:a16="http://schemas.microsoft.com/office/drawing/2014/main" id="{B4908FE8-CD3B-4352-807D-ADC32B680CFB}"/>
+              </a:ext>
+            </a:extLst>
+          </p:cNvPr>
+          <p:cNvPicPr>
+            <a:picLocks noChangeAspect="1"/>
+          </p:cNvPicPr>
+          <p:nvPr/>
+        </p:nvPicPr>
+        <p:blipFill>
+          <a:blip r:embed="rId5"/>
+          <a:stretch>
+            <a:fillRect/>
+          </a:stretch>
+        </p:blipFill>
+        <p:spPr>
+          <a:xfrm>
+            <a:off x="3403191" y="4833290"/>
+            <a:ext cx="6585440" cy="2054308"/>
+          </a:xfrm>
+          <a:prstGeom prst="rect">
+            <a:avLst/>
+          </a:prstGeom>
+        </p:spPr>
+      </p:pic>
+      <p:sp>
+        <p:nvSpPr>
+          <p:cNvPr id="53" name="TextBox 52">
+            <a:extLst>
+              <a:ext uri="{FF2B5EF4-FFF2-40B4-BE49-F238E27FC236}">
+                <a16:creationId xmlns:a16="http://schemas.microsoft.com/office/drawing/2014/main" id="{952FC86B-1B62-42AD-8B5D-99B31900222C}"/>
+              </a:ext>
+            </a:extLst>
+          </p:cNvPr>
+          <p:cNvSpPr txBox="1"/>
+          <p:nvPr/>
+        </p:nvSpPr>
+        <p:spPr>
+          <a:xfrm>
+            <a:off x="648693" y="5583445"/>
+            <a:ext cx="2754498" cy="369332"/>
+          </a:xfrm>
+          <a:prstGeom prst="rect">
+            <a:avLst/>
+          </a:prstGeom>
+          <a:noFill/>
+        </p:spPr>
+        <p:txBody>
+          <a:bodyPr wrap="square" rtlCol="0">
+            <a:spAutoFit/>
+          </a:bodyPr>
+          <a:lstStyle/>
+          <a:p>
+            <a:r>
+              <a:rPr lang="en-GB" b="1" dirty="0"/>
+              <a:t>2. Deadline tomorrow.</a:t>
+            </a:r>
+          </a:p>
+        </p:txBody>
+      </p:sp>
+      <p:sp>
+        <p:nvSpPr>
+          <p:cNvPr id="54" name="TextBox 53">
+            <a:extLst>
+              <a:ext uri="{FF2B5EF4-FFF2-40B4-BE49-F238E27FC236}">
+                <a16:creationId xmlns:a16="http://schemas.microsoft.com/office/drawing/2014/main" id="{C7C354F4-3F78-4684-9F0F-FDCA3AA5E8AE}"/>
+              </a:ext>
+            </a:extLst>
+          </p:cNvPr>
+          <p:cNvSpPr txBox="1"/>
+          <p:nvPr/>
+        </p:nvSpPr>
+        <p:spPr>
+          <a:xfrm>
+            <a:off x="9556066" y="2666126"/>
+            <a:ext cx="2921239" cy="369332"/>
+          </a:xfrm>
+          <a:prstGeom prst="rect">
+            <a:avLst/>
+          </a:prstGeom>
+          <a:noFill/>
+        </p:spPr>
+        <p:txBody>
+          <a:bodyPr wrap="square" rtlCol="0">
+            <a:spAutoFit/>
+          </a:bodyPr>
+          <a:lstStyle/>
+          <a:p>
+            <a:r>
+              <a:rPr lang="en-GB" b="1" dirty="0"/>
+              <a:t>1. Seminars on visible place</a:t>
+            </a:r>
+          </a:p>
+        </p:txBody>
+      </p:sp>
     </p:spTree>
     <p:extLst>
       <p:ext uri="{BB962C8B-B14F-4D97-AF65-F5344CB8AC3E}">

</xml_diff>

<commit_message>
update opp and lab rep
</commit_message>
<xml_diff>
--- a/news.pptx
+++ b/news.pptx
@@ -10,6 +10,7 @@
     <p:sldId id="258" r:id="rId4"/>
     <p:sldId id="259" r:id="rId5"/>
     <p:sldId id="260" r:id="rId6"/>
+    <p:sldId id="261" r:id="rId7"/>
   </p:sldIdLst>
   <p:sldSz cx="12192000" cy="6858000"/>
   <p:notesSz cx="6858000" cy="9144000"/>
@@ -119,7 +120,7 @@
 <file path=ppt/revisionInfo.xml><?xml version="1.0" encoding="utf-8"?>
 <p1510:revInfo xmlns:a="http://schemas.openxmlformats.org/drawingml/2006/main" xmlns:r="http://schemas.openxmlformats.org/officeDocument/2006/relationships" xmlns:p1510="http://schemas.microsoft.com/office/powerpoint/2015/10/main">
   <p1510:revLst>
-    <p1510:client id="{D453E9ED-2445-4863-8DAC-1F522F0E47F0}" v="33" dt="2021-11-29T10:33:05.875"/>
+    <p1510:client id="{E19A9581-60C2-4DEE-8383-EB74FB369CED}" v="6" dt="2022-02-02T09:54:43.723"/>
   </p1510:revLst>
 </p1510:revInfo>
 </file>
@@ -807,6 +808,173 @@
             <ac:cxnSpMk id="25" creationId="{A27B20E4-90A0-4AD0-A910-1979D13FBEF9}"/>
           </ac:cxnSpMkLst>
         </pc:cxnChg>
+      </pc:sldChg>
+    </pc:docChg>
+  </pc:docChgLst>
+  <pc:docChgLst>
+    <pc:chgData name="Lenka Hasova" userId="ea5c8ace-893c-4ae9-95cf-0ff1299a7b7a" providerId="ADAL" clId="{E19A9581-60C2-4DEE-8383-EB74FB369CED}"/>
+    <pc:docChg chg="undo custSel addSld modSld">
+      <pc:chgData name="Lenka Hasova" userId="ea5c8ace-893c-4ae9-95cf-0ff1299a7b7a" providerId="ADAL" clId="{E19A9581-60C2-4DEE-8383-EB74FB369CED}" dt="2022-02-02T09:55:08.800" v="209" actId="20577"/>
+      <pc:docMkLst>
+        <pc:docMk/>
+      </pc:docMkLst>
+      <pc:sldChg chg="addSp delSp mod">
+        <pc:chgData name="Lenka Hasova" userId="ea5c8ace-893c-4ae9-95cf-0ff1299a7b7a" providerId="ADAL" clId="{E19A9581-60C2-4DEE-8383-EB74FB369CED}" dt="2022-02-02T09:48:22.521" v="1" actId="22"/>
+        <pc:sldMkLst>
+          <pc:docMk/>
+          <pc:sldMk cId="3505615963" sldId="260"/>
+        </pc:sldMkLst>
+        <pc:spChg chg="add del">
+          <ac:chgData name="Lenka Hasova" userId="ea5c8ace-893c-4ae9-95cf-0ff1299a7b7a" providerId="ADAL" clId="{E19A9581-60C2-4DEE-8383-EB74FB369CED}" dt="2022-02-02T09:48:22.521" v="1" actId="22"/>
+          <ac:spMkLst>
+            <pc:docMk/>
+            <pc:sldMk cId="3505615963" sldId="260"/>
+            <ac:spMk id="18" creationId="{E8890C72-A85D-42F7-A726-F9F20A10C6A0}"/>
+          </ac:spMkLst>
+        </pc:spChg>
+      </pc:sldChg>
+      <pc:sldChg chg="addSp delSp modSp add mod">
+        <pc:chgData name="Lenka Hasova" userId="ea5c8ace-893c-4ae9-95cf-0ff1299a7b7a" providerId="ADAL" clId="{E19A9581-60C2-4DEE-8383-EB74FB369CED}" dt="2022-02-02T09:55:08.800" v="209" actId="20577"/>
+        <pc:sldMkLst>
+          <pc:docMk/>
+          <pc:sldMk cId="1541690451" sldId="261"/>
+        </pc:sldMkLst>
+        <pc:spChg chg="del">
+          <ac:chgData name="Lenka Hasova" userId="ea5c8ace-893c-4ae9-95cf-0ff1299a7b7a" providerId="ADAL" clId="{E19A9581-60C2-4DEE-8383-EB74FB369CED}" dt="2022-02-02T09:53:04.375" v="137" actId="478"/>
+          <ac:spMkLst>
+            <pc:docMk/>
+            <pc:sldMk cId="1541690451" sldId="261"/>
+            <ac:spMk id="4" creationId="{C47CCC9E-770E-4406-A6E1-CF6DE9317D3D}"/>
+          </ac:spMkLst>
+        </pc:spChg>
+        <pc:spChg chg="mod ord">
+          <ac:chgData name="Lenka Hasova" userId="ea5c8ace-893c-4ae9-95cf-0ff1299a7b7a" providerId="ADAL" clId="{E19A9581-60C2-4DEE-8383-EB74FB369CED}" dt="2022-02-02T09:54:46.172" v="167" actId="14100"/>
+          <ac:spMkLst>
+            <pc:docMk/>
+            <pc:sldMk cId="1541690451" sldId="261"/>
+            <ac:spMk id="5" creationId="{B1223149-D466-401A-BC5C-DF1D37FFE6C2}"/>
+          </ac:spMkLst>
+        </pc:spChg>
+        <pc:spChg chg="del mod">
+          <ac:chgData name="Lenka Hasova" userId="ea5c8ace-893c-4ae9-95cf-0ff1299a7b7a" providerId="ADAL" clId="{E19A9581-60C2-4DEE-8383-EB74FB369CED}" dt="2022-02-02T09:54:31.848" v="162" actId="478"/>
+          <ac:spMkLst>
+            <pc:docMk/>
+            <pc:sldMk cId="1541690451" sldId="261"/>
+            <ac:spMk id="14" creationId="{3C4A605D-A321-4B93-B2DA-B304654C790A}"/>
+          </ac:spMkLst>
+        </pc:spChg>
+        <pc:spChg chg="mod">
+          <ac:chgData name="Lenka Hasova" userId="ea5c8ace-893c-4ae9-95cf-0ff1299a7b7a" providerId="ADAL" clId="{E19A9581-60C2-4DEE-8383-EB74FB369CED}" dt="2022-02-02T09:54:37.835" v="164" actId="14100"/>
+          <ac:spMkLst>
+            <pc:docMk/>
+            <pc:sldMk cId="1541690451" sldId="261"/>
+            <ac:spMk id="15" creationId="{7D02956C-7E18-4418-8EFE-6364B5A5C6D6}"/>
+          </ac:spMkLst>
+        </pc:spChg>
+        <pc:spChg chg="del mod">
+          <ac:chgData name="Lenka Hasova" userId="ea5c8ace-893c-4ae9-95cf-0ff1299a7b7a" providerId="ADAL" clId="{E19A9581-60C2-4DEE-8383-EB74FB369CED}" dt="2022-02-02T09:54:41.687" v="165" actId="478"/>
+          <ac:spMkLst>
+            <pc:docMk/>
+            <pc:sldMk cId="1541690451" sldId="261"/>
+            <ac:spMk id="16" creationId="{C1F3BE31-786A-4533-9910-3DAA86E99B32}"/>
+          </ac:spMkLst>
+        </pc:spChg>
+        <pc:spChg chg="mod">
+          <ac:chgData name="Lenka Hasova" userId="ea5c8ace-893c-4ae9-95cf-0ff1299a7b7a" providerId="ADAL" clId="{E19A9581-60C2-4DEE-8383-EB74FB369CED}" dt="2022-02-02T09:55:08.800" v="209" actId="20577"/>
+          <ac:spMkLst>
+            <pc:docMk/>
+            <pc:sldMk cId="1541690451" sldId="261"/>
+            <ac:spMk id="17" creationId="{3E5FE9C4-CC46-494C-98F5-676D6A370018}"/>
+          </ac:spMkLst>
+        </pc:spChg>
+        <pc:spChg chg="add del mod">
+          <ac:chgData name="Lenka Hasova" userId="ea5c8ace-893c-4ae9-95cf-0ff1299a7b7a" providerId="ADAL" clId="{E19A9581-60C2-4DEE-8383-EB74FB369CED}" dt="2022-02-02T09:51:46.952" v="87" actId="478"/>
+          <ac:spMkLst>
+            <pc:docMk/>
+            <pc:sldMk cId="1541690451" sldId="261"/>
+            <ac:spMk id="18" creationId="{D354B017-6A8E-4C1F-8E6D-7F70CE156A68}"/>
+          </ac:spMkLst>
+        </pc:spChg>
+        <pc:spChg chg="add del mod">
+          <ac:chgData name="Lenka Hasova" userId="ea5c8ace-893c-4ae9-95cf-0ff1299a7b7a" providerId="ADAL" clId="{E19A9581-60C2-4DEE-8383-EB74FB369CED}" dt="2022-02-02T09:53:48.468" v="150"/>
+          <ac:spMkLst>
+            <pc:docMk/>
+            <pc:sldMk cId="1541690451" sldId="261"/>
+            <ac:spMk id="19" creationId="{6B345403-DEEA-4873-9AA7-4D0CA24840DF}"/>
+          </ac:spMkLst>
+        </pc:spChg>
+        <pc:spChg chg="add mod ord">
+          <ac:chgData name="Lenka Hasova" userId="ea5c8ace-893c-4ae9-95cf-0ff1299a7b7a" providerId="ADAL" clId="{E19A9581-60C2-4DEE-8383-EB74FB369CED}" dt="2022-02-02T09:54:29.539" v="161" actId="14100"/>
+          <ac:spMkLst>
+            <pc:docMk/>
+            <pc:sldMk cId="1541690451" sldId="261"/>
+            <ac:spMk id="22" creationId="{936DE5BD-3C58-4C18-A237-23802A408108}"/>
+          </ac:spMkLst>
+        </pc:spChg>
+        <pc:spChg chg="add mod ord">
+          <ac:chgData name="Lenka Hasova" userId="ea5c8ace-893c-4ae9-95cf-0ff1299a7b7a" providerId="ADAL" clId="{E19A9581-60C2-4DEE-8383-EB74FB369CED}" dt="2022-02-02T09:54:54.075" v="170" actId="1076"/>
+          <ac:spMkLst>
+            <pc:docMk/>
+            <pc:sldMk cId="1541690451" sldId="261"/>
+            <ac:spMk id="23" creationId="{7C6289F4-8C29-45E9-BD77-AA98606D655E}"/>
+          </ac:spMkLst>
+        </pc:spChg>
+        <pc:picChg chg="del">
+          <ac:chgData name="Lenka Hasova" userId="ea5c8ace-893c-4ae9-95cf-0ff1299a7b7a" providerId="ADAL" clId="{E19A9581-60C2-4DEE-8383-EB74FB369CED}" dt="2022-02-02T09:48:28.856" v="3" actId="478"/>
+          <ac:picMkLst>
+            <pc:docMk/>
+            <pc:sldMk cId="1541690451" sldId="261"/>
+            <ac:picMk id="7" creationId="{E3E73839-B1C8-4257-ADD6-48FE48ED2EB8}"/>
+          </ac:picMkLst>
+        </pc:picChg>
+        <pc:picChg chg="add mod">
+          <ac:chgData name="Lenka Hasova" userId="ea5c8ace-893c-4ae9-95cf-0ff1299a7b7a" providerId="ADAL" clId="{E19A9581-60C2-4DEE-8383-EB74FB369CED}" dt="2022-02-02T09:51:10.706" v="12" actId="14100"/>
+          <ac:picMkLst>
+            <pc:docMk/>
+            <pc:sldMk cId="1541690451" sldId="261"/>
+            <ac:picMk id="8" creationId="{45BD9E65-01A6-4EF2-98BA-8D098A610C67}"/>
+          </ac:picMkLst>
+        </pc:picChg>
+        <pc:picChg chg="del">
+          <ac:chgData name="Lenka Hasova" userId="ea5c8ace-893c-4ae9-95cf-0ff1299a7b7a" providerId="ADAL" clId="{E19A9581-60C2-4DEE-8383-EB74FB369CED}" dt="2022-02-02T09:48:30.037" v="5" actId="478"/>
+          <ac:picMkLst>
+            <pc:docMk/>
+            <pc:sldMk cId="1541690451" sldId="261"/>
+            <ac:picMk id="9" creationId="{D1F08DDD-7909-46B1-A42E-F11EFED9066A}"/>
+          </ac:picMkLst>
+        </pc:picChg>
+        <pc:picChg chg="del">
+          <ac:chgData name="Lenka Hasova" userId="ea5c8ace-893c-4ae9-95cf-0ff1299a7b7a" providerId="ADAL" clId="{E19A9581-60C2-4DEE-8383-EB74FB369CED}" dt="2022-02-02T09:48:30.582" v="6" actId="478"/>
+          <ac:picMkLst>
+            <pc:docMk/>
+            <pc:sldMk cId="1541690451" sldId="261"/>
+            <ac:picMk id="11" creationId="{CB8B2EAD-6CC9-4E28-B57E-4727C5E1A24B}"/>
+          </ac:picMkLst>
+        </pc:picChg>
+        <pc:picChg chg="add mod">
+          <ac:chgData name="Lenka Hasova" userId="ea5c8ace-893c-4ae9-95cf-0ff1299a7b7a" providerId="ADAL" clId="{E19A9581-60C2-4DEE-8383-EB74FB369CED}" dt="2022-02-02T09:53:16.763" v="143" actId="1076"/>
+          <ac:picMkLst>
+            <pc:docMk/>
+            <pc:sldMk cId="1541690451" sldId="261"/>
+            <ac:picMk id="12" creationId="{D041C867-FA86-454F-A754-D1B7B30D32A3}"/>
+          </ac:picMkLst>
+        </pc:picChg>
+        <pc:picChg chg="del">
+          <ac:chgData name="Lenka Hasova" userId="ea5c8ace-893c-4ae9-95cf-0ff1299a7b7a" providerId="ADAL" clId="{E19A9581-60C2-4DEE-8383-EB74FB369CED}" dt="2022-02-02T09:48:29.492" v="4" actId="478"/>
+          <ac:picMkLst>
+            <pc:docMk/>
+            <pc:sldMk cId="1541690451" sldId="261"/>
+            <ac:picMk id="13" creationId="{EAFDFFFF-8B2B-4E11-8EE3-907B28FE2A16}"/>
+          </ac:picMkLst>
+        </pc:picChg>
+        <pc:picChg chg="add mod">
+          <ac:chgData name="Lenka Hasova" userId="ea5c8ace-893c-4ae9-95cf-0ff1299a7b7a" providerId="ADAL" clId="{E19A9581-60C2-4DEE-8383-EB74FB369CED}" dt="2022-02-02T09:53:59.523" v="153" actId="1076"/>
+          <ac:picMkLst>
+            <pc:docMk/>
+            <pc:sldMk cId="1541690451" sldId="261"/>
+            <ac:picMk id="21" creationId="{1D4923BB-BADD-4264-8B14-34F8FB40ADE9}"/>
+          </ac:picMkLst>
+        </pc:picChg>
       </pc:sldChg>
     </pc:docChg>
   </pc:docChgLst>
@@ -962,7 +1130,7 @@
           <a:p>
             <a:fld id="{7A5AD6B1-77C4-4C61-A1B3-827CDB98672B}" type="datetimeFigureOut">
               <a:rPr lang="en-GB" smtClean="0"/>
-              <a:t>29/11/2021</a:t>
+              <a:t>02/02/2022</a:t>
             </a:fld>
             <a:endParaRPr lang="en-GB"/>
           </a:p>
@@ -1162,7 +1330,7 @@
           <a:p>
             <a:fld id="{7A5AD6B1-77C4-4C61-A1B3-827CDB98672B}" type="datetimeFigureOut">
               <a:rPr lang="en-GB" smtClean="0"/>
-              <a:t>29/11/2021</a:t>
+              <a:t>02/02/2022</a:t>
             </a:fld>
             <a:endParaRPr lang="en-GB"/>
           </a:p>
@@ -1372,7 +1540,7 @@
           <a:p>
             <a:fld id="{7A5AD6B1-77C4-4C61-A1B3-827CDB98672B}" type="datetimeFigureOut">
               <a:rPr lang="en-GB" smtClean="0"/>
-              <a:t>29/11/2021</a:t>
+              <a:t>02/02/2022</a:t>
             </a:fld>
             <a:endParaRPr lang="en-GB"/>
           </a:p>
@@ -1572,7 +1740,7 @@
           <a:p>
             <a:fld id="{7A5AD6B1-77C4-4C61-A1B3-827CDB98672B}" type="datetimeFigureOut">
               <a:rPr lang="en-GB" smtClean="0"/>
-              <a:t>29/11/2021</a:t>
+              <a:t>02/02/2022</a:t>
             </a:fld>
             <a:endParaRPr lang="en-GB"/>
           </a:p>
@@ -1848,7 +2016,7 @@
           <a:p>
             <a:fld id="{7A5AD6B1-77C4-4C61-A1B3-827CDB98672B}" type="datetimeFigureOut">
               <a:rPr lang="en-GB" smtClean="0"/>
-              <a:t>29/11/2021</a:t>
+              <a:t>02/02/2022</a:t>
             </a:fld>
             <a:endParaRPr lang="en-GB"/>
           </a:p>
@@ -2116,7 +2284,7 @@
           <a:p>
             <a:fld id="{7A5AD6B1-77C4-4C61-A1B3-827CDB98672B}" type="datetimeFigureOut">
               <a:rPr lang="en-GB" smtClean="0"/>
-              <a:t>29/11/2021</a:t>
+              <a:t>02/02/2022</a:t>
             </a:fld>
             <a:endParaRPr lang="en-GB"/>
           </a:p>
@@ -2531,7 +2699,7 @@
           <a:p>
             <a:fld id="{7A5AD6B1-77C4-4C61-A1B3-827CDB98672B}" type="datetimeFigureOut">
               <a:rPr lang="en-GB" smtClean="0"/>
-              <a:t>29/11/2021</a:t>
+              <a:t>02/02/2022</a:t>
             </a:fld>
             <a:endParaRPr lang="en-GB"/>
           </a:p>
@@ -2673,7 +2841,7 @@
           <a:p>
             <a:fld id="{7A5AD6B1-77C4-4C61-A1B3-827CDB98672B}" type="datetimeFigureOut">
               <a:rPr lang="en-GB" smtClean="0"/>
-              <a:t>29/11/2021</a:t>
+              <a:t>02/02/2022</a:t>
             </a:fld>
             <a:endParaRPr lang="en-GB"/>
           </a:p>
@@ -2786,7 +2954,7 @@
           <a:p>
             <a:fld id="{7A5AD6B1-77C4-4C61-A1B3-827CDB98672B}" type="datetimeFigureOut">
               <a:rPr lang="en-GB" smtClean="0"/>
-              <a:t>29/11/2021</a:t>
+              <a:t>02/02/2022</a:t>
             </a:fld>
             <a:endParaRPr lang="en-GB"/>
           </a:p>
@@ -3099,7 +3267,7 @@
           <a:p>
             <a:fld id="{7A5AD6B1-77C4-4C61-A1B3-827CDB98672B}" type="datetimeFigureOut">
               <a:rPr lang="en-GB" smtClean="0"/>
-              <a:t>29/11/2021</a:t>
+              <a:t>02/02/2022</a:t>
             </a:fld>
             <a:endParaRPr lang="en-GB"/>
           </a:p>
@@ -3388,7 +3556,7 @@
           <a:p>
             <a:fld id="{7A5AD6B1-77C4-4C61-A1B3-827CDB98672B}" type="datetimeFigureOut">
               <a:rPr lang="en-GB" smtClean="0"/>
-              <a:t>29/11/2021</a:t>
+              <a:t>02/02/2022</a:t>
             </a:fld>
             <a:endParaRPr lang="en-GB"/>
           </a:p>
@@ -3631,7 +3799,7 @@
           <a:p>
             <a:fld id="{7A5AD6B1-77C4-4C61-A1B3-827CDB98672B}" type="datetimeFigureOut">
               <a:rPr lang="en-GB" smtClean="0"/>
-              <a:t>29/11/2021</a:t>
+              <a:t>02/02/2022</a:t>
             </a:fld>
             <a:endParaRPr lang="en-GB"/>
           </a:p>
@@ -6908,6 +7076,486 @@
 </p:sld>
 </file>
 
+<file path=ppt/slides/slide6.xml><?xml version="1.0" encoding="utf-8"?>
+<p:sld xmlns:a="http://schemas.openxmlformats.org/drawingml/2006/main" xmlns:r="http://schemas.openxmlformats.org/officeDocument/2006/relationships" xmlns:p="http://schemas.openxmlformats.org/presentationml/2006/main">
+  <p:cSld>
+    <p:spTree>
+      <p:nvGrpSpPr>
+        <p:cNvPr id="1" name=""/>
+        <p:cNvGrpSpPr/>
+        <p:nvPr/>
+      </p:nvGrpSpPr>
+      <p:grpSpPr>
+        <a:xfrm>
+          <a:off x="0" y="0"/>
+          <a:ext cx="0" cy="0"/>
+          <a:chOff x="0" y="0"/>
+          <a:chExt cx="0" cy="0"/>
+        </a:xfrm>
+      </p:grpSpPr>
+      <p:sp>
+        <p:nvSpPr>
+          <p:cNvPr id="23" name="Rectangle 22">
+            <a:extLst>
+              <a:ext uri="{FF2B5EF4-FFF2-40B4-BE49-F238E27FC236}">
+                <a16:creationId xmlns:a16="http://schemas.microsoft.com/office/drawing/2014/main" id="{7C6289F4-8C29-45E9-BD77-AA98606D655E}"/>
+              </a:ext>
+            </a:extLst>
+          </p:cNvPr>
+          <p:cNvSpPr/>
+          <p:nvPr/>
+        </p:nvSpPr>
+        <p:spPr>
+          <a:xfrm>
+            <a:off x="5378254" y="690518"/>
+            <a:ext cx="6813746" cy="2393699"/>
+          </a:xfrm>
+          <a:prstGeom prst="rect">
+            <a:avLst/>
+          </a:prstGeom>
+          <a:solidFill>
+            <a:schemeClr val="accent1">
+              <a:lumMod val="20000"/>
+              <a:lumOff val="80000"/>
+            </a:schemeClr>
+          </a:solidFill>
+          <a:ln>
+            <a:noFill/>
+          </a:ln>
+        </p:spPr>
+        <p:style>
+          <a:lnRef idx="2">
+            <a:schemeClr val="accent1">
+              <a:shade val="50000"/>
+            </a:schemeClr>
+          </a:lnRef>
+          <a:fillRef idx="1">
+            <a:schemeClr val="accent1"/>
+          </a:fillRef>
+          <a:effectRef idx="0">
+            <a:schemeClr val="accent1"/>
+          </a:effectRef>
+          <a:fontRef idx="minor">
+            <a:schemeClr val="lt1"/>
+          </a:fontRef>
+        </p:style>
+        <p:txBody>
+          <a:bodyPr rtlCol="0" anchor="ctr"/>
+          <a:lstStyle/>
+          <a:p>
+            <a:pPr algn="ctr"/>
+            <a:endParaRPr lang="en-GB"/>
+          </a:p>
+        </p:txBody>
+      </p:sp>
+      <p:sp>
+        <p:nvSpPr>
+          <p:cNvPr id="5" name="Rectangle 4">
+            <a:extLst>
+              <a:ext uri="{FF2B5EF4-FFF2-40B4-BE49-F238E27FC236}">
+                <a16:creationId xmlns:a16="http://schemas.microsoft.com/office/drawing/2014/main" id="{B1223149-D466-401A-BC5C-DF1D37FFE6C2}"/>
+              </a:ext>
+            </a:extLst>
+          </p:cNvPr>
+          <p:cNvSpPr/>
+          <p:nvPr/>
+        </p:nvSpPr>
+        <p:spPr>
+          <a:xfrm>
+            <a:off x="1" y="726294"/>
+            <a:ext cx="5683321" cy="3958722"/>
+          </a:xfrm>
+          <a:prstGeom prst="rect">
+            <a:avLst/>
+          </a:prstGeom>
+          <a:solidFill>
+            <a:schemeClr val="accent4">
+              <a:lumMod val="20000"/>
+              <a:lumOff val="80000"/>
+            </a:schemeClr>
+          </a:solidFill>
+          <a:ln>
+            <a:noFill/>
+          </a:ln>
+        </p:spPr>
+        <p:style>
+          <a:lnRef idx="2">
+            <a:schemeClr val="accent1">
+              <a:shade val="50000"/>
+            </a:schemeClr>
+          </a:lnRef>
+          <a:fillRef idx="1">
+            <a:schemeClr val="accent1"/>
+          </a:fillRef>
+          <a:effectRef idx="0">
+            <a:schemeClr val="accent1"/>
+          </a:effectRef>
+          <a:fontRef idx="minor">
+            <a:schemeClr val="lt1"/>
+          </a:fontRef>
+        </p:style>
+        <p:txBody>
+          <a:bodyPr rtlCol="0" anchor="ctr"/>
+          <a:lstStyle/>
+          <a:p>
+            <a:pPr algn="ctr"/>
+            <a:endParaRPr lang="en-GB"/>
+          </a:p>
+        </p:txBody>
+      </p:sp>
+      <p:sp>
+        <p:nvSpPr>
+          <p:cNvPr id="22" name="Rectangle 21">
+            <a:extLst>
+              <a:ext uri="{FF2B5EF4-FFF2-40B4-BE49-F238E27FC236}">
+                <a16:creationId xmlns:a16="http://schemas.microsoft.com/office/drawing/2014/main" id="{936DE5BD-3C58-4C18-A237-23802A408108}"/>
+              </a:ext>
+            </a:extLst>
+          </p:cNvPr>
+          <p:cNvSpPr/>
+          <p:nvPr/>
+        </p:nvSpPr>
+        <p:spPr>
+          <a:xfrm>
+            <a:off x="-42575" y="4500077"/>
+            <a:ext cx="6813746" cy="2393699"/>
+          </a:xfrm>
+          <a:prstGeom prst="rect">
+            <a:avLst/>
+          </a:prstGeom>
+          <a:solidFill>
+            <a:schemeClr val="accent1">
+              <a:lumMod val="20000"/>
+              <a:lumOff val="80000"/>
+            </a:schemeClr>
+          </a:solidFill>
+          <a:ln>
+            <a:noFill/>
+          </a:ln>
+        </p:spPr>
+        <p:style>
+          <a:lnRef idx="2">
+            <a:schemeClr val="accent1">
+              <a:shade val="50000"/>
+            </a:schemeClr>
+          </a:lnRef>
+          <a:fillRef idx="1">
+            <a:schemeClr val="accent1"/>
+          </a:fillRef>
+          <a:effectRef idx="0">
+            <a:schemeClr val="accent1"/>
+          </a:effectRef>
+          <a:fontRef idx="minor">
+            <a:schemeClr val="lt1"/>
+          </a:fontRef>
+        </p:style>
+        <p:txBody>
+          <a:bodyPr rtlCol="0" anchor="ctr"/>
+          <a:lstStyle/>
+          <a:p>
+            <a:pPr algn="ctr"/>
+            <a:endParaRPr lang="en-GB"/>
+          </a:p>
+        </p:txBody>
+      </p:sp>
+      <p:sp>
+        <p:nvSpPr>
+          <p:cNvPr id="15" name="Rectangle 14">
+            <a:extLst>
+              <a:ext uri="{FF2B5EF4-FFF2-40B4-BE49-F238E27FC236}">
+                <a16:creationId xmlns:a16="http://schemas.microsoft.com/office/drawing/2014/main" id="{7D02956C-7E18-4418-8EFE-6364B5A5C6D6}"/>
+              </a:ext>
+            </a:extLst>
+          </p:cNvPr>
+          <p:cNvSpPr/>
+          <p:nvPr/>
+        </p:nvSpPr>
+        <p:spPr>
+          <a:xfrm>
+            <a:off x="5683322" y="2644886"/>
+            <a:ext cx="6508678" cy="4213114"/>
+          </a:xfrm>
+          <a:prstGeom prst="rect">
+            <a:avLst/>
+          </a:prstGeom>
+          <a:solidFill>
+            <a:schemeClr val="accent4">
+              <a:lumMod val="20000"/>
+              <a:lumOff val="80000"/>
+            </a:schemeClr>
+          </a:solidFill>
+          <a:ln>
+            <a:noFill/>
+          </a:ln>
+        </p:spPr>
+        <p:style>
+          <a:lnRef idx="2">
+            <a:schemeClr val="accent1">
+              <a:shade val="50000"/>
+            </a:schemeClr>
+          </a:lnRef>
+          <a:fillRef idx="1">
+            <a:schemeClr val="accent1"/>
+          </a:fillRef>
+          <a:effectRef idx="0">
+            <a:schemeClr val="accent1"/>
+          </a:effectRef>
+          <a:fontRef idx="minor">
+            <a:schemeClr val="lt1"/>
+          </a:fontRef>
+        </p:style>
+        <p:txBody>
+          <a:bodyPr rtlCol="0" anchor="ctr"/>
+          <a:lstStyle/>
+          <a:p>
+            <a:pPr algn="ctr"/>
+            <a:endParaRPr lang="en-GB"/>
+          </a:p>
+        </p:txBody>
+      </p:sp>
+      <p:sp>
+        <p:nvSpPr>
+          <p:cNvPr id="2" name="TextBox 1">
+            <a:extLst>
+              <a:ext uri="{FF2B5EF4-FFF2-40B4-BE49-F238E27FC236}">
+                <a16:creationId xmlns:a16="http://schemas.microsoft.com/office/drawing/2014/main" id="{632C0D62-B4AD-478D-84C9-33179BDE50E0}"/>
+              </a:ext>
+            </a:extLst>
+          </p:cNvPr>
+          <p:cNvSpPr txBox="1"/>
+          <p:nvPr/>
+        </p:nvSpPr>
+        <p:spPr>
+          <a:xfrm>
+            <a:off x="327803" y="109670"/>
+            <a:ext cx="2115131" cy="523220"/>
+          </a:xfrm>
+          <a:prstGeom prst="rect">
+            <a:avLst/>
+          </a:prstGeom>
+          <a:noFill/>
+        </p:spPr>
+        <p:txBody>
+          <a:bodyPr wrap="none" rtlCol="0">
+            <a:spAutoFit/>
+          </a:bodyPr>
+          <a:lstStyle/>
+          <a:p>
+            <a:r>
+              <a:rPr lang="en-GB" sz="2800" b="1" dirty="0">
+                <a:solidFill>
+                  <a:srgbClr val="FF0000"/>
+                </a:solidFill>
+              </a:rPr>
+              <a:t>What’s new?</a:t>
+            </a:r>
+          </a:p>
+        </p:txBody>
+      </p:sp>
+      <p:sp>
+        <p:nvSpPr>
+          <p:cNvPr id="3" name="TextBox 2">
+            <a:extLst>
+              <a:ext uri="{FF2B5EF4-FFF2-40B4-BE49-F238E27FC236}">
+                <a16:creationId xmlns:a16="http://schemas.microsoft.com/office/drawing/2014/main" id="{EBF31359-98AD-4195-98E1-D422DB412006}"/>
+              </a:ext>
+            </a:extLst>
+          </p:cNvPr>
+          <p:cNvSpPr txBox="1"/>
+          <p:nvPr/>
+        </p:nvSpPr>
+        <p:spPr>
+          <a:xfrm>
+            <a:off x="9183911" y="203074"/>
+            <a:ext cx="2680286" cy="523220"/>
+          </a:xfrm>
+          <a:prstGeom prst="rect">
+            <a:avLst/>
+          </a:prstGeom>
+          <a:noFill/>
+        </p:spPr>
+        <p:txBody>
+          <a:bodyPr wrap="none" rtlCol="0">
+            <a:spAutoFit/>
+          </a:bodyPr>
+          <a:lstStyle/>
+          <a:p>
+            <a:r>
+              <a:rPr lang="en-GB" sz="2800" b="1" dirty="0">
+                <a:solidFill>
+                  <a:srgbClr val="FF0000"/>
+                </a:solidFill>
+              </a:rPr>
+              <a:t>geogbrowns.info</a:t>
+            </a:r>
+          </a:p>
+        </p:txBody>
+      </p:sp>
+      <p:sp>
+        <p:nvSpPr>
+          <p:cNvPr id="17" name="TextBox 16">
+            <a:extLst>
+              <a:ext uri="{FF2B5EF4-FFF2-40B4-BE49-F238E27FC236}">
+                <a16:creationId xmlns:a16="http://schemas.microsoft.com/office/drawing/2014/main" id="{3E5FE9C4-CC46-494C-98F5-676D6A370018}"/>
+              </a:ext>
+            </a:extLst>
+          </p:cNvPr>
+          <p:cNvSpPr txBox="1"/>
+          <p:nvPr/>
+        </p:nvSpPr>
+        <p:spPr>
+          <a:xfrm>
+            <a:off x="6771171" y="1112413"/>
+            <a:ext cx="3915829" cy="1200329"/>
+          </a:xfrm>
+          <a:prstGeom prst="rect">
+            <a:avLst/>
+          </a:prstGeom>
+          <a:noFill/>
+        </p:spPr>
+        <p:txBody>
+          <a:bodyPr wrap="square" rtlCol="0">
+            <a:spAutoFit/>
+          </a:bodyPr>
+          <a:lstStyle/>
+          <a:p>
+            <a:pPr marL="285750" indent="-285750">
+              <a:buFont typeface="Arial" panose="020B0604020202020204" pitchFamily="34" charset="0"/>
+              <a:buChar char="•"/>
+            </a:pPr>
+            <a:r>
+              <a:rPr lang="en-GB" b="1" dirty="0"/>
+              <a:t>Victoria has joined our Rep team</a:t>
+            </a:r>
+          </a:p>
+          <a:p>
+            <a:pPr marL="285750" indent="-285750">
+              <a:buFont typeface="Arial" panose="020B0604020202020204" pitchFamily="34" charset="0"/>
+              <a:buChar char="•"/>
+            </a:pPr>
+            <a:r>
+              <a:rPr lang="en-GB" b="1" dirty="0"/>
+              <a:t>New opportunities</a:t>
+            </a:r>
+          </a:p>
+          <a:p>
+            <a:pPr marL="285750" indent="-285750">
+              <a:buFont typeface="Arial" panose="020B0604020202020204" pitchFamily="34" charset="0"/>
+              <a:buChar char="•"/>
+            </a:pPr>
+            <a:r>
+              <a:rPr lang="en-GB" b="1" dirty="0"/>
+              <a:t>Don’t forget for Friday social</a:t>
+            </a:r>
+          </a:p>
+          <a:p>
+            <a:endParaRPr lang="en-GB" b="1" dirty="0"/>
+          </a:p>
+        </p:txBody>
+      </p:sp>
+      <p:pic>
+        <p:nvPicPr>
+          <p:cNvPr id="8" name="Picture 7">
+            <a:extLst>
+              <a:ext uri="{FF2B5EF4-FFF2-40B4-BE49-F238E27FC236}">
+                <a16:creationId xmlns:a16="http://schemas.microsoft.com/office/drawing/2014/main" id="{45BD9E65-01A6-4EF2-98BA-8D098A610C67}"/>
+              </a:ext>
+            </a:extLst>
+          </p:cNvPr>
+          <p:cNvPicPr>
+            <a:picLocks noChangeAspect="1"/>
+          </p:cNvPicPr>
+          <p:nvPr/>
+        </p:nvPicPr>
+        <p:blipFill>
+          <a:blip r:embed="rId2"/>
+          <a:stretch>
+            <a:fillRect/>
+          </a:stretch>
+        </p:blipFill>
+        <p:spPr>
+          <a:xfrm>
+            <a:off x="390859" y="1079863"/>
+            <a:ext cx="4683775" cy="3204461"/>
+          </a:xfrm>
+          <a:prstGeom prst="rect">
+            <a:avLst/>
+          </a:prstGeom>
+        </p:spPr>
+      </p:pic>
+      <p:pic>
+        <p:nvPicPr>
+          <p:cNvPr id="12" name="Picture 11">
+            <a:extLst>
+              <a:ext uri="{FF2B5EF4-FFF2-40B4-BE49-F238E27FC236}">
+                <a16:creationId xmlns:a16="http://schemas.microsoft.com/office/drawing/2014/main" id="{D041C867-FA86-454F-A754-D1B7B30D32A3}"/>
+              </a:ext>
+            </a:extLst>
+          </p:cNvPr>
+          <p:cNvPicPr>
+            <a:picLocks noChangeAspect="1"/>
+          </p:cNvPicPr>
+          <p:nvPr/>
+        </p:nvPicPr>
+        <p:blipFill>
+          <a:blip r:embed="rId3"/>
+          <a:stretch>
+            <a:fillRect/>
+          </a:stretch>
+        </p:blipFill>
+        <p:spPr>
+          <a:xfrm>
+            <a:off x="6394231" y="2796952"/>
+            <a:ext cx="5353007" cy="3898805"/>
+          </a:xfrm>
+          <a:prstGeom prst="rect">
+            <a:avLst/>
+          </a:prstGeom>
+        </p:spPr>
+      </p:pic>
+      <p:pic>
+        <p:nvPicPr>
+          <p:cNvPr id="21" name="Picture 20">
+            <a:extLst>
+              <a:ext uri="{FF2B5EF4-FFF2-40B4-BE49-F238E27FC236}">
+                <a16:creationId xmlns:a16="http://schemas.microsoft.com/office/drawing/2014/main" id="{1D4923BB-BADD-4264-8B14-34F8FB40ADE9}"/>
+              </a:ext>
+            </a:extLst>
+          </p:cNvPr>
+          <p:cNvPicPr>
+            <a:picLocks noChangeAspect="1"/>
+          </p:cNvPicPr>
+          <p:nvPr/>
+        </p:nvPicPr>
+        <p:blipFill>
+          <a:blip r:embed="rId4"/>
+          <a:stretch>
+            <a:fillRect/>
+          </a:stretch>
+        </p:blipFill>
+        <p:spPr>
+          <a:xfrm>
+            <a:off x="635212" y="4825942"/>
+            <a:ext cx="4857749" cy="1633537"/>
+          </a:xfrm>
+          <a:prstGeom prst="rect">
+            <a:avLst/>
+          </a:prstGeom>
+        </p:spPr>
+      </p:pic>
+    </p:spTree>
+    <p:extLst>
+      <p:ext uri="{BB962C8B-B14F-4D97-AF65-F5344CB8AC3E}">
+        <p14:creationId xmlns:p14="http://schemas.microsoft.com/office/powerpoint/2010/main" val="1541690451"/>
+      </p:ext>
+    </p:extLst>
+  </p:cSld>
+  <p:clrMapOvr>
+    <a:masterClrMapping/>
+  </p:clrMapOvr>
+</p:sld>
+</file>
+
 <file path=ppt/theme/theme1.xml><?xml version="1.0" encoding="utf-8"?>
 <a:theme xmlns:a="http://schemas.openxmlformats.org/drawingml/2006/main" name="Office Theme">
   <a:themeElements>

</xml_diff>